<commit_message>
Update packaging presentation with user modifications
- Revised packaging slides with updated content
- Enhanced visual presentation and details

Co-Authored-By: Warp <agent@warp.dev>
</commit_message>
<xml_diff>
--- a/Intel_Core_Ultra_Series_3_Packaging.pptx
+++ b/Intel_Core_Ultra_Series_3_Packaging.pptx
@@ -5,10 +5,11 @@
     <p:sldMasterId id="2147483648" r:id="rId1"/>
   </p:sldMasterIdLst>
   <p:notesMasterIdLst>
-    <p:notesMasterId r:id="rId3"/>
+    <p:notesMasterId r:id="rId4"/>
   </p:notesMasterIdLst>
   <p:sldIdLst>
     <p:sldId id="256" r:id="rId2"/>
+    <p:sldId id="257" r:id="rId3"/>
   </p:sldIdLst>
   <p:sldSz cx="9144000" cy="6858000" type="screen4x3"/>
   <p:notesSz cx="6858000" cy="9144000"/>
@@ -4960,6 +4961,170 @@
         </p:txBody>
       </p:sp>
     </p:spTree>
+  </p:cSld>
+  <p:clrMapOvr>
+    <a:masterClrMapping/>
+  </p:clrMapOvr>
+</p:sld>
+</file>
+
+<file path=ppt/slides/slide2.xml><?xml version="1.0" encoding="utf-8"?>
+<p:sld xmlns:a="http://schemas.openxmlformats.org/drawingml/2006/main" xmlns:r="http://schemas.openxmlformats.org/officeDocument/2006/relationships" xmlns:p="http://schemas.openxmlformats.org/presentationml/2006/main">
+  <p:cSld>
+    <p:spTree>
+      <p:nvGrpSpPr>
+        <p:cNvPr id="1" name=""/>
+        <p:cNvGrpSpPr/>
+        <p:nvPr/>
+      </p:nvGrpSpPr>
+      <p:grpSpPr>
+        <a:xfrm>
+          <a:off x="0" y="0"/>
+          <a:ext cx="0" cy="0"/>
+          <a:chOff x="0" y="0"/>
+          <a:chExt cx="0" cy="0"/>
+        </a:xfrm>
+      </p:grpSpPr>
+      <p:pic>
+        <p:nvPicPr>
+          <p:cNvPr id="7" name="Picture 6" descr="A group of rectangular objects with blue and silver colors&#10;&#10;AI-generated content may be incorrect.">
+            <a:extLst>
+              <a:ext uri="{FF2B5EF4-FFF2-40B4-BE49-F238E27FC236}">
+                <a16:creationId xmlns:a16="http://schemas.microsoft.com/office/drawing/2014/main" id="{64CE25BC-5AB6-C580-AC9C-98FCE431A2B7}"/>
+              </a:ext>
+            </a:extLst>
+          </p:cNvPr>
+          <p:cNvPicPr>
+            <a:picLocks noChangeAspect="1"/>
+          </p:cNvPicPr>
+          <p:nvPr/>
+        </p:nvPicPr>
+        <p:blipFill>
+          <a:blip r:embed="rId2">
+            <a:alphaModFix amt="76000"/>
+            <a:extLst>
+              <a:ext uri="{BEBA8EAE-BF5A-486C-A8C5-ECC9F3942E4B}">
+                <a14:imgProps xmlns:a14="http://schemas.microsoft.com/office/drawing/2010/main">
+                  <a14:imgLayer r:embed="rId3">
+                    <a14:imgEffect>
+                      <a14:sharpenSoften amount="-25000"/>
+                    </a14:imgEffect>
+                  </a14:imgLayer>
+                </a14:imgProps>
+              </a:ext>
+            </a:extLst>
+          </a:blip>
+          <a:srcRect l="-1183" r="20866"/>
+          <a:stretch>
+            <a:fillRect/>
+          </a:stretch>
+        </p:blipFill>
+        <p:spPr>
+          <a:xfrm>
+            <a:off x="-155448" y="17146"/>
+            <a:ext cx="9326880" cy="6840854"/>
+          </a:xfrm>
+          <a:prstGeom prst="rect">
+            <a:avLst/>
+          </a:prstGeom>
+        </p:spPr>
+      </p:pic>
+      <p:pic>
+        <p:nvPicPr>
+          <p:cNvPr id="5" name="Picture 4" descr="A group of computer components&#10;&#10;AI-generated content may be incorrect.">
+            <a:extLst>
+              <a:ext uri="{FF2B5EF4-FFF2-40B4-BE49-F238E27FC236}">
+                <a16:creationId xmlns:a16="http://schemas.microsoft.com/office/drawing/2014/main" id="{4E3E65BE-2279-4E51-B7C9-2396956184AE}"/>
+              </a:ext>
+            </a:extLst>
+          </p:cNvPr>
+          <p:cNvPicPr>
+            <a:picLocks noChangeAspect="1"/>
+          </p:cNvPicPr>
+          <p:nvPr/>
+        </p:nvPicPr>
+        <p:blipFill>
+          <a:blip r:embed="rId4"/>
+          <a:stretch>
+            <a:fillRect/>
+          </a:stretch>
+        </p:blipFill>
+        <p:spPr>
+          <a:xfrm>
+            <a:off x="1450154" y="835600"/>
+            <a:ext cx="3569677" cy="1856232"/>
+          </a:xfrm>
+          <a:prstGeom prst="rect">
+            <a:avLst/>
+          </a:prstGeom>
+        </p:spPr>
+      </p:pic>
+      <p:pic>
+        <p:nvPicPr>
+          <p:cNvPr id="9" name="Picture 8" descr="A person standing on a stage&#10;&#10;AI-generated content may be incorrect.">
+            <a:extLst>
+              <a:ext uri="{FF2B5EF4-FFF2-40B4-BE49-F238E27FC236}">
+                <a16:creationId xmlns:a16="http://schemas.microsoft.com/office/drawing/2014/main" id="{F8F5F09B-4DEB-E970-0A52-6DFDEA330E2B}"/>
+              </a:ext>
+            </a:extLst>
+          </p:cNvPr>
+          <p:cNvPicPr>
+            <a:picLocks noChangeAspect="1"/>
+          </p:cNvPicPr>
+          <p:nvPr/>
+        </p:nvPicPr>
+        <p:blipFill>
+          <a:blip r:embed="rId5"/>
+          <a:stretch>
+            <a:fillRect/>
+          </a:stretch>
+        </p:blipFill>
+        <p:spPr>
+          <a:xfrm>
+            <a:off x="4352882" y="2221992"/>
+            <a:ext cx="2486829" cy="1307592"/>
+          </a:xfrm>
+          <a:prstGeom prst="rect">
+            <a:avLst/>
+          </a:prstGeom>
+        </p:spPr>
+      </p:pic>
+      <p:pic>
+        <p:nvPicPr>
+          <p:cNvPr id="3" name="Picture 2" descr="A box with a logo&#10;&#10;AI-generated content may be incorrect.">
+            <a:extLst>
+              <a:ext uri="{FF2B5EF4-FFF2-40B4-BE49-F238E27FC236}">
+                <a16:creationId xmlns:a16="http://schemas.microsoft.com/office/drawing/2014/main" id="{7B139DCA-503B-6739-8758-F974519A80B5}"/>
+              </a:ext>
+            </a:extLst>
+          </p:cNvPr>
+          <p:cNvPicPr>
+            <a:picLocks noChangeAspect="1"/>
+          </p:cNvPicPr>
+          <p:nvPr/>
+        </p:nvPicPr>
+        <p:blipFill>
+          <a:blip r:embed="rId6"/>
+          <a:stretch>
+            <a:fillRect/>
+          </a:stretch>
+        </p:blipFill>
+        <p:spPr>
+          <a:xfrm>
+            <a:off x="2117103" y="3161671"/>
+            <a:ext cx="2390889" cy="2390889"/>
+          </a:xfrm>
+          <a:prstGeom prst="rect">
+            <a:avLst/>
+          </a:prstGeom>
+        </p:spPr>
+      </p:pic>
+    </p:spTree>
+    <p:extLst>
+      <p:ext uri="{BB962C8B-B14F-4D97-AF65-F5344CB8AC3E}">
+        <p14:creationId xmlns:p14="http://schemas.microsoft.com/office/powerpoint/2010/main" val="1375602131"/>
+      </p:ext>
+    </p:extLst>
   </p:cSld>
   <p:clrMapOvr>
     <a:masterClrMapping/>

</xml_diff>